<commit_message>
[Publication Review] Drug Repositioning
</commit_message>
<xml_diff>
--- a/Review/Computational Drug Repositioning (2).pptx
+++ b/Review/Computational Drug Repositioning (2).pptx
@@ -11,13 +11,14 @@
     <p:sldId id="256" r:id="rId8"/>
     <p:sldId id="257" r:id="rId9"/>
     <p:sldId id="258" r:id="rId10"/>
-    <p:sldId id="259" r:id="rId11"/>
-    <p:sldId id="260" r:id="rId12"/>
-    <p:sldId id="261" r:id="rId13"/>
-    <p:sldId id="262" r:id="rId14"/>
-    <p:sldId id="263" r:id="rId15"/>
-    <p:sldId id="264" r:id="rId16"/>
-    <p:sldId id="265" r:id="rId17"/>
+    <p:sldId id="259" r:id="rId12"/>
+    <p:sldId id="260" r:id="rId13"/>
+    <p:sldId id="261" r:id="rId14"/>
+    <p:sldId id="262" r:id="rId15"/>
+    <p:sldId id="263" r:id="rId16"/>
+    <p:sldId id="264" r:id="rId17"/>
+    <p:sldId id="265" r:id="rId18"/>
+    <p:sldId id="266" r:id="rId19"/>
   </p:sldIdLst>
   <p:sldSz cx="13004800" cy="9753600"/>
   <p:notesSz cx="6858000" cy="9144000"/>
@@ -323,7 +324,21 @@
 </file>
 
 <file path=ppt/commentAuthors.xml><?xml version="1.0" encoding="utf-8"?>
-<p:cmAuthorLst xmlns:a="http://schemas.openxmlformats.org/drawingml/2006/main" xmlns:r="http://schemas.openxmlformats.org/officeDocument/2006/relationships" xmlns:p="http://schemas.openxmlformats.org/presentationml/2006/main"/>
+<p:cmAuthorLst xmlns:a="http://schemas.openxmlformats.org/drawingml/2006/main" xmlns:r="http://schemas.openxmlformats.org/officeDocument/2006/relationships" xmlns:p="http://schemas.openxmlformats.org/presentationml/2006/main">
+  <p:cmAuthor id="0" name="박민석" initials="박" lastIdx="1" clrIdx="0"/>
+</p:cmAuthorLst>
+</file>
+
+<file path=ppt/comments/comment1.xml><?xml version="1.0" encoding="utf-8"?>
+<p:cmLst xmlns:a="http://schemas.openxmlformats.org/drawingml/2006/main" xmlns:r="http://schemas.openxmlformats.org/officeDocument/2006/relationships" xmlns:p="http://schemas.openxmlformats.org/presentationml/2006/main">
+  <p:cm authorId="0" dt="2016-06-30T10:01:00.445" idx="1">
+    <p:pos x="5455" y="559"/>
+    <p:text>인간 유전체 연구는 특정 질병간의 연결이 존재한다는 것을 말해주고 있다.
+next-generation sequencing 같은 최근 기술 발전은 과감하게 모든 exon sequencing의 비용을 줄임으로써 유전자-질병 관계의 발견을 가속화하고있다.
+GWAS 는 유전적 다양성과 질병간의 관계를 보여주며 많은 복잡한 질병이 이 다양주고 있다.
+GWAS 에 의해 gene-disease 관계는 리포지셔닝 가능성이 있음을 보여주고 있다.</p:text>
+  </p:cm>
+</p:cmLst>
 </file>
 
 <file path=ppt/notesMasters/notesMaster1.xml><?xml version="1.0" encoding="utf-8"?>
@@ -3084,7 +3099,158 @@
       </p:grpSpPr>
       <p:sp>
         <p:nvSpPr>
-          <p:cNvPr id="146" name="Shape 146"/>
+          <p:cNvPr id="147" name="Shape 147"/>
+          <p:cNvSpPr/>
+          <p:nvPr>
+            <p:ph type="title"/>
+          </p:nvPr>
+        </p:nvSpPr>
+        <p:spPr>
+          <a:prstGeom prst="rect">
+            <a:avLst/>
+          </a:prstGeom>
+        </p:spPr>
+        <p:txBody>
+          <a:bodyPr/>
+          <a:lstStyle/>
+          <a:p>
+            <a:pPr algn="l">
+              <a:defRPr sz="5000"/>
+            </a:pPr>
+            <a:r>
+              <a:t>Other Methods : </a:t>
+            </a:r>
+            <a:r>
+              <a:rPr sz="2700"/>
+              <a:t>Observational studies, EHRs, and social media</a:t>
+            </a:r>
+          </a:p>
+        </p:txBody>
+      </p:sp>
+      <p:sp>
+        <p:nvSpPr>
+          <p:cNvPr id="148" name="Shape 148"/>
+          <p:cNvSpPr/>
+          <p:nvPr/>
+        </p:nvSpPr>
+        <p:spPr>
+          <a:xfrm>
+            <a:off x="952500" y="2781300"/>
+            <a:ext cx="11099800" cy="5840512"/>
+          </a:xfrm>
+          <a:prstGeom prst="rect">
+            <a:avLst/>
+          </a:prstGeom>
+          <a:ln w="12700">
+            <a:miter lim="400000"/>
+          </a:ln>
+          <a:extLst>
+            <a:ext uri="{C572A759-6A51-4108-AA02-DFA0A04FC94B}">
+              <ma14:wrappingTextBoxFlag xmlns:ma14="http://schemas.microsoft.com/office/mac/drawingml/2011/main" val="1"/>
+            </a:ext>
+          </a:extLst>
+        </p:spPr>
+        <p:txBody>
+          <a:bodyPr lIns="50800" tIns="50800" rIns="50800" bIns="50800" anchor="ctr">
+            <a:normAutofit fontScale="100000" lnSpcReduction="0"/>
+          </a:bodyPr>
+          <a:lstStyle/>
+          <a:p>
+            <a:pPr marL="529166" indent="-529166" algn="l" defTabSz="350520">
+              <a:buSzPct val="100000"/>
+              <a:buAutoNum type="arabicPeriod" startAt="1"/>
+              <a:defRPr sz="3000">
+                <a:latin typeface="Apple SD 산돌고딕 Neo 세미볼드체"/>
+                <a:ea typeface="Apple SD 산돌고딕 Neo 세미볼드체"/>
+                <a:cs typeface="Apple SD 산돌고딕 Neo 세미볼드체"/>
+                <a:sym typeface="Apple SD 산돌고딕 Neo 세미볼드체"/>
+              </a:defRPr>
+            </a:pPr>
+            <a:r>
+              <a:t>As drugs progress into the clinic, they generate clinical data that can be analyzed for repositioning opportunities. The almost incomprehensible volume and complexity of EHRs present opportunities that could well be the source of the next great advances in drug repositioning.</a:t>
+            </a:r>
+          </a:p>
+          <a:p>
+            <a:pPr algn="l" defTabSz="350520">
+              <a:defRPr sz="3000">
+                <a:latin typeface="Apple SD 산돌고딕 Neo 세미볼드체"/>
+                <a:ea typeface="Apple SD 산돌고딕 Neo 세미볼드체"/>
+                <a:cs typeface="Apple SD 산돌고딕 Neo 세미볼드체"/>
+                <a:sym typeface="Apple SD 산돌고딕 Neo 세미볼드체"/>
+              </a:defRPr>
+            </a:pPr>
+          </a:p>
+          <a:p>
+            <a:pPr marL="529166" indent="-529166" algn="l" defTabSz="350520">
+              <a:buSzPct val="100000"/>
+              <a:buAutoNum type="arabicPeriod" startAt="2"/>
+              <a:defRPr sz="3000">
+                <a:latin typeface="Apple SD 산돌고딕 Neo 세미볼드체"/>
+                <a:ea typeface="Apple SD 산돌고딕 Neo 세미볼드체"/>
+                <a:cs typeface="Apple SD 산돌고딕 Neo 세미볼드체"/>
+                <a:sym typeface="Apple SD 산돌고딕 Neo 세미볼드체"/>
+              </a:defRPr>
+            </a:pPr>
+            <a:r>
+              <a:t>Experimental validation and independent validation add verify to computational hypothesis.</a:t>
+            </a:r>
+          </a:p>
+          <a:p>
+            <a:pPr algn="l" defTabSz="350520">
+              <a:defRPr sz="3000">
+                <a:latin typeface="Apple SD 산돌고딕 Neo 세미볼드체"/>
+                <a:ea typeface="Apple SD 산돌고딕 Neo 세미볼드체"/>
+                <a:cs typeface="Apple SD 산돌고딕 Neo 세미볼드체"/>
+                <a:sym typeface="Apple SD 산돌고딕 Neo 세미볼드체"/>
+              </a:defRPr>
+            </a:pPr>
+          </a:p>
+          <a:p>
+            <a:pPr marL="529166" indent="-529166" algn="l" defTabSz="350520">
+              <a:buSzPct val="100000"/>
+              <a:buAutoNum type="arabicPeriod" startAt="3"/>
+              <a:defRPr sz="3000">
+                <a:latin typeface="Apple SD 산돌고딕 Neo 세미볼드체"/>
+                <a:ea typeface="Apple SD 산돌고딕 Neo 세미볼드체"/>
+                <a:cs typeface="Apple SD 산돌고딕 Neo 세미볼드체"/>
+                <a:sym typeface="Apple SD 산돌고딕 Neo 세미볼드체"/>
+              </a:defRPr>
+            </a:pPr>
+            <a:r>
+              <a:t>Without a computational hypothesis, a preclinical or clinical hypothesis may not be actionable; however, once the two are put together, they can accelerate the path toward a clinical trial.</a:t>
+            </a:r>
+          </a:p>
+        </p:txBody>
+      </p:sp>
+    </p:spTree>
+  </p:cSld>
+  <p:clrMapOvr>
+    <a:masterClrMapping/>
+  </p:clrMapOvr>
+  <p:transition xmlns:p14="http://schemas.microsoft.com/office/powerpoint/2010/main" spd="med" advClick="1" p14:dur="1000"/>
+</p:sld>
+</file>
+
+<file path=ppt/slides/slide11.xml><?xml version="1.0" encoding="utf-8"?>
+<p:sld xmlns:a="http://schemas.openxmlformats.org/drawingml/2006/main" xmlns:r="http://schemas.openxmlformats.org/officeDocument/2006/relationships" xmlns:p="http://schemas.openxmlformats.org/presentationml/2006/main" showMasterSp="1" showMasterPhAnim="1">
+  <p:cSld>
+    <p:spTree>
+      <p:nvGrpSpPr>
+        <p:cNvPr id="1" name=""/>
+        <p:cNvGrpSpPr/>
+        <p:nvPr/>
+      </p:nvGrpSpPr>
+      <p:grpSpPr>
+        <a:xfrm>
+          <a:off x="0" y="0"/>
+          <a:ext cx="0" cy="0"/>
+          <a:chOff x="0" y="0"/>
+          <a:chExt cx="0" cy="0"/>
+        </a:xfrm>
+      </p:grpSpPr>
+      <p:sp>
+        <p:nvSpPr>
+          <p:cNvPr id="150" name="Shape 150"/>
           <p:cNvSpPr/>
           <p:nvPr>
             <p:ph type="title"/>
@@ -3112,7 +3278,7 @@
       </p:sp>
       <p:sp>
         <p:nvSpPr>
-          <p:cNvPr id="147" name="Shape 147"/>
+          <p:cNvPr id="151" name="Shape 151"/>
           <p:cNvSpPr/>
           <p:nvPr/>
         </p:nvSpPr>
@@ -3267,8 +3433,8 @@
         </p:nvSpPr>
         <p:spPr>
           <a:xfrm>
-            <a:off x="952500" y="2781299"/>
-            <a:ext cx="11099800" cy="5840513"/>
+            <a:off x="952500" y="2781300"/>
+            <a:ext cx="11099800" cy="5840512"/>
           </a:xfrm>
           <a:prstGeom prst="rect">
             <a:avLst/>
@@ -3617,31 +3783,58 @@
         </p:spPr>
         <p:txBody>
           <a:bodyPr/>
-          <a:lstStyle/>
-          <a:p>
-            <a:pPr algn="l">
+          <a:lstStyle>
+            <a:lvl1pPr algn="l">
               <a:defRPr sz="5000"/>
-            </a:pPr>
-            <a:r>
-              <a:t>Other Methods : </a:t>
-            </a:r>
-            <a:r>
-              <a:rPr sz="4000"/>
-              <a:t>Pathway and Network</a:t>
+            </a:lvl1pPr>
+          </a:lstStyle>
+          <a:p>
+            <a:pPr/>
+            <a:r>
+              <a:t>Other Methods</a:t>
             </a:r>
           </a:p>
         </p:txBody>
       </p:sp>
+      <p:pic>
+        <p:nvPicPr>
+          <p:cNvPr id="129" name="스크린샷 2016-06-30 오전 11.09.18.png"/>
+          <p:cNvPicPr>
+            <a:picLocks noChangeAspect="1"/>
+          </p:cNvPicPr>
+          <p:nvPr/>
+        </p:nvPicPr>
+        <p:blipFill>
+          <a:blip r:embed="rId2">
+            <a:extLst/>
+          </a:blip>
+          <a:stretch>
+            <a:fillRect/>
+          </a:stretch>
+        </p:blipFill>
+        <p:spPr>
+          <a:xfrm>
+            <a:off x="3314642" y="2232505"/>
+            <a:ext cx="6375516" cy="4729790"/>
+          </a:xfrm>
+          <a:prstGeom prst="rect">
+            <a:avLst/>
+          </a:prstGeom>
+          <a:ln w="12700">
+            <a:miter lim="400000"/>
+          </a:ln>
+        </p:spPr>
+      </p:pic>
       <p:sp>
         <p:nvSpPr>
-          <p:cNvPr id="129" name="Shape 129"/>
+          <p:cNvPr id="130" name="Shape 130"/>
           <p:cNvSpPr/>
           <p:nvPr/>
         </p:nvSpPr>
         <p:spPr>
           <a:xfrm>
-            <a:off x="952500" y="2781300"/>
-            <a:ext cx="11099800" cy="5840512"/>
+            <a:off x="952500" y="6505575"/>
+            <a:ext cx="11099800" cy="2840137"/>
           </a:xfrm>
           <a:prstGeom prst="rect">
             <a:avLst/>
@@ -3659,120 +3852,22 @@
           <a:bodyPr lIns="50800" tIns="50800" rIns="50800" bIns="50800" anchor="ctr">
             <a:normAutofit fontScale="100000" lnSpcReduction="0"/>
           </a:bodyPr>
-          <a:lstStyle/>
-          <a:p>
-            <a:pPr marL="476250" indent="-476250" algn="l" defTabSz="315468">
+          <a:lstStyle>
+            <a:lvl1pPr marL="881944" indent="-881944" algn="l">
               <a:buSzPct val="100000"/>
               <a:buAutoNum type="arabicPeriod" startAt="1"/>
-              <a:defRPr sz="2700">
+              <a:defRPr sz="3000">
                 <a:latin typeface="Apple SD 산돌고딕 Neo 세미볼드체"/>
                 <a:ea typeface="Apple SD 산돌고딕 Neo 세미볼드체"/>
                 <a:cs typeface="Apple SD 산돌고딕 Neo 세미볼드체"/>
                 <a:sym typeface="Apple SD 산돌고딕 Neo 세미볼드체"/>
               </a:defRPr>
-            </a:pPr>
-            <a:r>
-              <a:t>Diseases can be connected to one another in a network on the basis of shared features.</a:t>
-            </a:r>
-          </a:p>
-          <a:p>
-            <a:pPr algn="l" defTabSz="315468">
-              <a:defRPr sz="2700">
-                <a:latin typeface="Apple SD 산돌고딕 Neo 세미볼드체"/>
-                <a:ea typeface="Apple SD 산돌고딕 Neo 세미볼드체"/>
-                <a:cs typeface="Apple SD 산돌고딕 Neo 세미볼드체"/>
-                <a:sym typeface="Apple SD 산돌고딕 Neo 세미볼드체"/>
-              </a:defRPr>
-            </a:pPr>
-          </a:p>
-          <a:p>
-            <a:pPr marL="476250" indent="-476250" algn="l" defTabSz="315468">
-              <a:buSzPct val="100000"/>
-              <a:buAutoNum type="arabicPeriod" startAt="2"/>
-              <a:defRPr sz="2700">
-                <a:latin typeface="Apple SD 산돌고딕 Neo 세미볼드체"/>
-                <a:ea typeface="Apple SD 산돌고딕 Neo 세미볼드체"/>
-                <a:cs typeface="Apple SD 산돌고딕 Neo 세미볼드체"/>
-                <a:sym typeface="Apple SD 산돌고딕 Neo 세미볼드체"/>
-              </a:defRPr>
-            </a:pPr>
-            <a:r>
-              <a:t>Chiang and Butte used another disease similarity approach that they termed “guilt by association”</a:t>
-            </a:r>
-          </a:p>
-          <a:p>
-            <a:pPr algn="l" defTabSz="315468">
-              <a:defRPr sz="2700">
-                <a:latin typeface="Apple SD 산돌고딕 Neo 세미볼드체"/>
-                <a:ea typeface="Apple SD 산돌고딕 Neo 세미볼드체"/>
-                <a:cs typeface="Apple SD 산돌고딕 Neo 세미볼드체"/>
-                <a:sym typeface="Apple SD 산돌고딕 Neo 세미볼드체"/>
-              </a:defRPr>
-            </a:pPr>
-          </a:p>
-          <a:p>
-            <a:pPr marL="476250" indent="-476250" algn="l" defTabSz="315468">
-              <a:buSzPct val="100000"/>
-              <a:buAutoNum type="arabicPeriod" startAt="3"/>
-              <a:defRPr sz="2700">
-                <a:latin typeface="Apple SD 산돌고딕 Neo 세미볼드체"/>
-                <a:ea typeface="Apple SD 산돌고딕 Neo 세미볼드체"/>
-                <a:cs typeface="Apple SD 산돌고딕 Neo 세미볼드체"/>
-                <a:sym typeface="Apple SD 산돌고딕 Neo 세미볼드체"/>
-              </a:defRPr>
-            </a:pPr>
-            <a:r>
-              <a:t>The researchers showed that suggestions based on this method were 12 times more likely to lead to a clinical trial with the hypotheses.</a:t>
-            </a:r>
-          </a:p>
-          <a:p>
-            <a:pPr algn="l" defTabSz="315468">
-              <a:defRPr sz="2700">
-                <a:latin typeface="Apple SD 산돌고딕 Neo 세미볼드체"/>
-                <a:ea typeface="Apple SD 산돌고딕 Neo 세미볼드체"/>
-                <a:cs typeface="Apple SD 산돌고딕 Neo 세미볼드체"/>
-                <a:sym typeface="Apple SD 산돌고딕 Neo 세미볼드체"/>
-              </a:defRPr>
-            </a:pPr>
-          </a:p>
-          <a:p>
-            <a:pPr marL="476250" indent="-476250" algn="l" defTabSz="315468">
-              <a:buSzPct val="100000"/>
-              <a:buAutoNum type="arabicPeriod" startAt="4"/>
-              <a:defRPr sz="2700">
-                <a:latin typeface="Apple SD 산돌고딕 Neo 세미볼드체"/>
-                <a:ea typeface="Apple SD 산돌고딕 Neo 세미볼드체"/>
-                <a:cs typeface="Apple SD 산돌고딕 Neo 세미볼드체"/>
-                <a:sym typeface="Apple SD 산돌고딕 Neo 세미볼드체"/>
-              </a:defRPr>
-            </a:pPr>
-            <a:r>
-              <a:t>However, the black-box nature of these predictions can present a challenge for experimental verification.</a:t>
-            </a:r>
-          </a:p>
-          <a:p>
-            <a:pPr algn="l" defTabSz="315468">
-              <a:defRPr sz="2700">
-                <a:latin typeface="Apple SD 산돌고딕 Neo 세미볼드체"/>
-                <a:ea typeface="Apple SD 산돌고딕 Neo 세미볼드체"/>
-                <a:cs typeface="Apple SD 산돌고딕 Neo 세미볼드체"/>
-                <a:sym typeface="Apple SD 산돌고딕 Neo 세미볼드체"/>
-              </a:defRPr>
-            </a:pPr>
-          </a:p>
-          <a:p>
-            <a:pPr marL="476250" indent="-476250" algn="l" defTabSz="315468">
-              <a:buSzPct val="100000"/>
-              <a:buAutoNum type="arabicPeriod" startAt="5"/>
-              <a:defRPr sz="2700">
-                <a:latin typeface="Apple SD 산돌고딕 Neo 세미볼드체"/>
-                <a:ea typeface="Apple SD 산돌고딕 Neo 세미볼드체"/>
-                <a:cs typeface="Apple SD 산돌고딕 Neo 세미볼드체"/>
-                <a:sym typeface="Apple SD 산돌고딕 Neo 세미볼드체"/>
-              </a:defRPr>
-            </a:pPr>
-            <a:r>
-              <a:t>If the precision of these techniques is proven to be high, they will gain more widespread acceptance and will be experimentally validated.</a:t>
+            </a:lvl1pPr>
+          </a:lstStyle>
+          <a:p>
+            <a:pPr/>
+            <a:r>
+              <a:t>The various stages of drug discovery produce additional data relevant to repurposing.</a:t>
             </a:r>
           </a:p>
         </p:txBody>
@@ -3805,7 +3900,7 @@
       </p:grpSpPr>
       <p:sp>
         <p:nvSpPr>
-          <p:cNvPr id="131" name="Shape 131"/>
+          <p:cNvPr id="132" name="Shape 132"/>
           <p:cNvSpPr/>
           <p:nvPr>
             <p:ph type="title"/>
@@ -3828,14 +3923,14 @@
             </a:r>
             <a:r>
               <a:rPr sz="4000"/>
-              <a:t>Screening</a:t>
+              <a:t>Pathway and Network</a:t>
             </a:r>
           </a:p>
         </p:txBody>
       </p:sp>
       <p:sp>
         <p:nvSpPr>
-          <p:cNvPr id="132" name="Shape 132"/>
+          <p:cNvPr id="133" name="Shape 133"/>
           <p:cNvSpPr/>
           <p:nvPr/>
         </p:nvSpPr>
@@ -3862,10 +3957,10 @@
           </a:bodyPr>
           <a:lstStyle/>
           <a:p>
-            <a:pPr marL="661458" indent="-661458" algn="l" defTabSz="438150">
+            <a:pPr marL="476250" indent="-476250" algn="l" defTabSz="315468">
               <a:buSzPct val="100000"/>
               <a:buAutoNum type="arabicPeriod" startAt="1"/>
-              <a:defRPr sz="3750">
+              <a:defRPr sz="2700">
                 <a:latin typeface="Apple SD 산돌고딕 Neo 세미볼드체"/>
                 <a:ea typeface="Apple SD 산돌고딕 Neo 세미볼드체"/>
                 <a:cs typeface="Apple SD 산돌고딕 Neo 세미볼드체"/>
@@ -3873,12 +3968,12 @@
               </a:defRPr>
             </a:pPr>
             <a:r>
-              <a:t>High-throughput screening results may be a rich source of repositioning hypotheses.</a:t>
-            </a:r>
-          </a:p>
-          <a:p>
-            <a:pPr algn="l" defTabSz="438150">
-              <a:defRPr sz="3750">
+              <a:t>Diseases can be connected to one another in a network on the basis of shared features.</a:t>
+            </a:r>
+          </a:p>
+          <a:p>
+            <a:pPr algn="l" defTabSz="315468">
+              <a:defRPr sz="2700">
                 <a:latin typeface="Apple SD 산돌고딕 Neo 세미볼드체"/>
                 <a:ea typeface="Apple SD 산돌고딕 Neo 세미볼드체"/>
                 <a:cs typeface="Apple SD 산돌고딕 Neo 세미볼드체"/>
@@ -3887,10 +3982,10 @@
             </a:pPr>
           </a:p>
           <a:p>
-            <a:pPr marL="661458" indent="-661458" algn="l" defTabSz="438150">
+            <a:pPr marL="476250" indent="-476250" algn="l" defTabSz="315468">
               <a:buSzPct val="100000"/>
               <a:buAutoNum type="arabicPeriod" startAt="2"/>
-              <a:defRPr sz="3750">
+              <a:defRPr sz="2700">
                 <a:latin typeface="Apple SD 산돌고딕 Neo 세미볼드체"/>
                 <a:ea typeface="Apple SD 산돌고딕 Neo 세미볼드체"/>
                 <a:cs typeface="Apple SD 산돌고딕 Neo 세미볼드체"/>
@@ -3898,12 +3993,12 @@
               </a:defRPr>
             </a:pPr>
             <a:r>
-              <a:t>If a drug or a closely related molecule is active in a phenotypic screen, it presents the simplest of cases for reposition- ing, and it should be tested in the disease associated with that phenotype.</a:t>
-            </a:r>
-          </a:p>
-          <a:p>
-            <a:pPr algn="l" defTabSz="438150">
-              <a:defRPr sz="3750">
+              <a:t>Chiang and Butte used another disease similarity approach that they termed “guilt by association”</a:t>
+            </a:r>
+          </a:p>
+          <a:p>
+            <a:pPr algn="l" defTabSz="315468">
+              <a:defRPr sz="2700">
                 <a:latin typeface="Apple SD 산돌고딕 Neo 세미볼드체"/>
                 <a:ea typeface="Apple SD 산돌고딕 Neo 세미볼드체"/>
                 <a:cs typeface="Apple SD 산돌고딕 Neo 세미볼드체"/>
@@ -3912,10 +4007,10 @@
             </a:pPr>
           </a:p>
           <a:p>
-            <a:pPr marL="661458" indent="-661458" algn="l" defTabSz="438150">
+            <a:pPr marL="476250" indent="-476250" algn="l" defTabSz="315468">
               <a:buSzPct val="100000"/>
               <a:buAutoNum type="arabicPeriod" startAt="3"/>
-              <a:defRPr sz="3750">
+              <a:defRPr sz="2700">
                 <a:latin typeface="Apple SD 산돌고딕 Neo 세미볼드체"/>
                 <a:ea typeface="Apple SD 산돌고딕 Neo 세미볼드체"/>
                 <a:cs typeface="Apple SD 산돌고딕 Neo 세미볼드체"/>
@@ -3923,7 +4018,57 @@
               </a:defRPr>
             </a:pPr>
             <a:r>
-              <a:t>Screening is conceivable that similar approaches may be used to predict disease indications as well.</a:t>
+              <a:t>The researchers showed that suggestions based on this method were 12 times more likely to lead to a clinical trial with the hypotheses.</a:t>
+            </a:r>
+          </a:p>
+          <a:p>
+            <a:pPr algn="l" defTabSz="315468">
+              <a:defRPr sz="2700">
+                <a:latin typeface="Apple SD 산돌고딕 Neo 세미볼드체"/>
+                <a:ea typeface="Apple SD 산돌고딕 Neo 세미볼드체"/>
+                <a:cs typeface="Apple SD 산돌고딕 Neo 세미볼드체"/>
+                <a:sym typeface="Apple SD 산돌고딕 Neo 세미볼드체"/>
+              </a:defRPr>
+            </a:pPr>
+          </a:p>
+          <a:p>
+            <a:pPr marL="476250" indent="-476250" algn="l" defTabSz="315468">
+              <a:buSzPct val="100000"/>
+              <a:buAutoNum type="arabicPeriod" startAt="4"/>
+              <a:defRPr sz="2700">
+                <a:latin typeface="Apple SD 산돌고딕 Neo 세미볼드체"/>
+                <a:ea typeface="Apple SD 산돌고딕 Neo 세미볼드체"/>
+                <a:cs typeface="Apple SD 산돌고딕 Neo 세미볼드체"/>
+                <a:sym typeface="Apple SD 산돌고딕 Neo 세미볼드체"/>
+              </a:defRPr>
+            </a:pPr>
+            <a:r>
+              <a:t>However, the black-box nature of these predictions can present a challenge for experimental verification.</a:t>
+            </a:r>
+          </a:p>
+          <a:p>
+            <a:pPr algn="l" defTabSz="315468">
+              <a:defRPr sz="2700">
+                <a:latin typeface="Apple SD 산돌고딕 Neo 세미볼드체"/>
+                <a:ea typeface="Apple SD 산돌고딕 Neo 세미볼드체"/>
+                <a:cs typeface="Apple SD 산돌고딕 Neo 세미볼드체"/>
+                <a:sym typeface="Apple SD 산돌고딕 Neo 세미볼드체"/>
+              </a:defRPr>
+            </a:pPr>
+          </a:p>
+          <a:p>
+            <a:pPr marL="476250" indent="-476250" algn="l" defTabSz="315468">
+              <a:buSzPct val="100000"/>
+              <a:buAutoNum type="arabicPeriod" startAt="5"/>
+              <a:defRPr sz="2700">
+                <a:latin typeface="Apple SD 산돌고딕 Neo 세미볼드체"/>
+                <a:ea typeface="Apple SD 산돌고딕 Neo 세미볼드체"/>
+                <a:cs typeface="Apple SD 산돌고딕 Neo 세미볼드체"/>
+                <a:sym typeface="Apple SD 산돌고딕 Neo 세미볼드체"/>
+              </a:defRPr>
+            </a:pPr>
+            <a:r>
+              <a:t>If the precision of these techniques is proven to be high, they will gain more widespread acceptance and will be experimentally validated.</a:t>
             </a:r>
           </a:p>
         </p:txBody>
@@ -3956,7 +4101,7 @@
       </p:grpSpPr>
       <p:sp>
         <p:nvSpPr>
-          <p:cNvPr id="134" name="Shape 134"/>
+          <p:cNvPr id="135" name="Shape 135"/>
           <p:cNvSpPr/>
           <p:nvPr>
             <p:ph type="title"/>
@@ -3979,14 +4124,14 @@
             </a:r>
             <a:r>
               <a:rPr sz="4000"/>
-              <a:t>Off-target effects</a:t>
+              <a:t>Screening</a:t>
             </a:r>
           </a:p>
         </p:txBody>
       </p:sp>
       <p:sp>
         <p:nvSpPr>
-          <p:cNvPr id="135" name="Shape 135"/>
+          <p:cNvPr id="136" name="Shape 136"/>
           <p:cNvSpPr/>
           <p:nvPr/>
         </p:nvSpPr>
@@ -4013,10 +4158,10 @@
           </a:bodyPr>
           <a:lstStyle/>
           <a:p>
-            <a:pPr marL="564444" indent="-564444" algn="l" defTabSz="373887">
+            <a:pPr marL="661458" indent="-661458" algn="l" defTabSz="438150">
               <a:buSzPct val="100000"/>
               <a:buAutoNum type="arabicPeriod" startAt="1"/>
-              <a:defRPr sz="3200">
+              <a:defRPr sz="3750">
                 <a:latin typeface="Apple SD 산돌고딕 Neo 세미볼드체"/>
                 <a:ea typeface="Apple SD 산돌고딕 Neo 세미볼드체"/>
                 <a:cs typeface="Apple SD 산돌고딕 Neo 세미볼드체"/>
@@ -4024,12 +4169,12 @@
               </a:defRPr>
             </a:pPr>
             <a:r>
-              <a:t>An approach that uses knowledge of both compound and protein structure is molecular docking,50 which estimates the physicochemical strength of ligand–protein interactions. </a:t>
-            </a:r>
-          </a:p>
-          <a:p>
-            <a:pPr algn="l" defTabSz="373887">
-              <a:defRPr sz="3200">
+              <a:t>High-throughput screening results may be a rich source of repositioning hypotheses.</a:t>
+            </a:r>
+          </a:p>
+          <a:p>
+            <a:pPr algn="l" defTabSz="438150">
+              <a:defRPr sz="3750">
                 <a:latin typeface="Apple SD 산돌고딕 Neo 세미볼드체"/>
                 <a:ea typeface="Apple SD 산돌고딕 Neo 세미볼드체"/>
                 <a:cs typeface="Apple SD 산돌고딕 Neo 세미볼드체"/>
@@ -4038,10 +4183,10 @@
             </a:pPr>
           </a:p>
           <a:p>
-            <a:pPr marL="564444" indent="-564444" algn="l" defTabSz="373887">
+            <a:pPr marL="661458" indent="-661458" algn="l" defTabSz="438150">
               <a:buSzPct val="100000"/>
               <a:buAutoNum type="arabicPeriod" startAt="2"/>
-              <a:defRPr sz="3200">
+              <a:defRPr sz="3750">
                 <a:latin typeface="Apple SD 산돌고딕 Neo 세미볼드체"/>
                 <a:ea typeface="Apple SD 산돌고딕 Neo 세미볼드체"/>
                 <a:cs typeface="Apple SD 산돌고딕 Neo 세미볼드체"/>
@@ -4049,12 +4194,12 @@
               </a:defRPr>
             </a:pPr>
             <a:r>
-              <a:t>This approach has successfully identified the psychiatric drug haloperidol as a lead anti-HIV compound.</a:t>
-            </a:r>
-          </a:p>
-          <a:p>
-            <a:pPr algn="l" defTabSz="373887">
-              <a:defRPr sz="3200">
+              <a:t>If a drug or a closely related molecule is active in a phenotypic screen, it presents the simplest of cases for reposition- ing, and it should be tested in the disease associated with that phenotype.</a:t>
+            </a:r>
+          </a:p>
+          <a:p>
+            <a:pPr algn="l" defTabSz="438150">
+              <a:defRPr sz="3750">
                 <a:latin typeface="Apple SD 산돌고딕 Neo 세미볼드체"/>
                 <a:ea typeface="Apple SD 산돌고딕 Neo 세미볼드체"/>
                 <a:cs typeface="Apple SD 산돌고딕 Neo 세미볼드체"/>
@@ -4063,10 +4208,10 @@
             </a:pPr>
           </a:p>
           <a:p>
-            <a:pPr marL="564444" indent="-564444" algn="l" defTabSz="373887">
+            <a:pPr marL="661458" indent="-661458" algn="l" defTabSz="438150">
               <a:buSzPct val="100000"/>
               <a:buAutoNum type="arabicPeriod" startAt="3"/>
-              <a:defRPr sz="3200">
+              <a:defRPr sz="3750">
                 <a:latin typeface="Apple SD 산돌고딕 Neo 세미볼드체"/>
                 <a:ea typeface="Apple SD 산돌고딕 Neo 세미볼드체"/>
                 <a:cs typeface="Apple SD 산돌고딕 Neo 세미볼드체"/>
@@ -4074,7 +4219,7 @@
               </a:defRPr>
             </a:pPr>
             <a:r>
-              <a:t>Because the compound will also bind to its originally identified target under most conditions, repositioning between anti-infective drugs and human targets is likely to be the most efficacious application of off -target methods.</a:t>
+              <a:t>Screening is conceivable that similar approaches may be used to predict disease indications as well.</a:t>
             </a:r>
           </a:p>
         </p:txBody>
@@ -4107,7 +4252,7 @@
       </p:grpSpPr>
       <p:sp>
         <p:nvSpPr>
-          <p:cNvPr id="137" name="Shape 137"/>
+          <p:cNvPr id="138" name="Shape 138"/>
           <p:cNvSpPr/>
           <p:nvPr>
             <p:ph type="title"/>
@@ -4130,14 +4275,14 @@
             </a:r>
             <a:r>
               <a:rPr sz="4000"/>
-              <a:t>In vivo</a:t>
+              <a:t>Off-target effects</a:t>
             </a:r>
           </a:p>
         </p:txBody>
       </p:sp>
       <p:sp>
         <p:nvSpPr>
-          <p:cNvPr id="138" name="Shape 138"/>
+          <p:cNvPr id="139" name="Shape 139"/>
           <p:cNvSpPr/>
           <p:nvPr/>
         </p:nvSpPr>
@@ -4164,10 +4309,10 @@
           </a:bodyPr>
           <a:lstStyle/>
           <a:p>
-            <a:pPr marL="573263" indent="-573263" algn="l" defTabSz="379729">
+            <a:pPr marL="564444" indent="-564444" algn="l" defTabSz="373887">
               <a:buSzPct val="100000"/>
               <a:buAutoNum type="arabicPeriod" startAt="1"/>
-              <a:defRPr sz="3250">
+              <a:defRPr sz="3200">
                 <a:latin typeface="Apple SD 산돌고딕 Neo 세미볼드체"/>
                 <a:ea typeface="Apple SD 산돌고딕 Neo 세미볼드체"/>
                 <a:cs typeface="Apple SD 산돌고딕 Neo 세미볼드체"/>
@@ -4175,12 +4320,12 @@
               </a:defRPr>
             </a:pPr>
             <a:r>
-              <a:t>In vivo phenotypic screening targeted mutations has been widely used to associate genes with phenotypes.</a:t>
-            </a:r>
-          </a:p>
-          <a:p>
-            <a:pPr algn="l" defTabSz="379729">
-              <a:defRPr sz="3250">
+              <a:t>An approach that uses knowledge of both compound and protein structure is molecular docking,50 which estimates the physicochemical strength of ligand–protein interactions. </a:t>
+            </a:r>
+          </a:p>
+          <a:p>
+            <a:pPr algn="l" defTabSz="373887">
+              <a:defRPr sz="3200">
                 <a:latin typeface="Apple SD 산돌고딕 Neo 세미볼드체"/>
                 <a:ea typeface="Apple SD 산돌고딕 Neo 세미볼드체"/>
                 <a:cs typeface="Apple SD 산돌고딕 Neo 세미볼드체"/>
@@ -4189,10 +4334,10 @@
             </a:pPr>
           </a:p>
           <a:p>
-            <a:pPr marL="573263" indent="-573263" algn="l" defTabSz="379729">
+            <a:pPr marL="564444" indent="-564444" algn="l" defTabSz="373887">
               <a:buSzPct val="100000"/>
               <a:buAutoNum type="arabicPeriod" startAt="2"/>
-              <a:defRPr sz="3250">
+              <a:defRPr sz="3200">
                 <a:latin typeface="Apple SD 산돌고딕 Neo 세미볼드체"/>
                 <a:ea typeface="Apple SD 산돌고딕 Neo 세미볼드체"/>
                 <a:cs typeface="Apple SD 산돌고딕 Neo 세미볼드체"/>
@@ -4200,12 +4345,12 @@
               </a:defRPr>
             </a:pPr>
             <a:r>
-              <a:t> The Mouse Phenome Database (http://phenome.jax.org) contains about 1,400 phenotypic measurements related to human dis- eases, including cancer susceptibility, aging, obesity, infections, atherosclerosis, blood disorders etc.</a:t>
-            </a:r>
-          </a:p>
-          <a:p>
-            <a:pPr algn="l" defTabSz="379729">
-              <a:defRPr sz="3250">
+              <a:t>This approach has successfully identified the psychiatric drug haloperidol as a lead anti-HIV compound.</a:t>
+            </a:r>
+          </a:p>
+          <a:p>
+            <a:pPr algn="l" defTabSz="373887">
+              <a:defRPr sz="3200">
                 <a:latin typeface="Apple SD 산돌고딕 Neo 세미볼드체"/>
                 <a:ea typeface="Apple SD 산돌고딕 Neo 세미볼드체"/>
                 <a:cs typeface="Apple SD 산돌고딕 Neo 세미볼드체"/>
@@ -4214,10 +4359,10 @@
             </a:pPr>
           </a:p>
           <a:p>
-            <a:pPr marL="573263" indent="-573263" algn="l" defTabSz="379729">
+            <a:pPr marL="564444" indent="-564444" algn="l" defTabSz="373887">
               <a:buSzPct val="100000"/>
               <a:buAutoNum type="arabicPeriod" startAt="3"/>
-              <a:defRPr sz="3250">
+              <a:defRPr sz="3200">
                 <a:latin typeface="Apple SD 산돌고딕 Neo 세미볼드체"/>
                 <a:ea typeface="Apple SD 산돌고딕 Neo 세미볼드체"/>
                 <a:cs typeface="Apple SD 산돌고딕 Neo 세미볼드체"/>
@@ -4225,7 +4370,7 @@
               </a:defRPr>
             </a:pPr>
             <a:r>
-              <a:t>We believe such data will play an increasing role in future repositioning efforts, although the translation of  findings from in vivo models to humans may prove challenging.</a:t>
+              <a:t>Because the compound will also bind to its originally identified target under most conditions, repositioning between anti-infective drugs and human targets is likely to be the most efficacious application of off -target methods.</a:t>
             </a:r>
           </a:p>
         </p:txBody>
@@ -4258,7 +4403,7 @@
       </p:grpSpPr>
       <p:sp>
         <p:nvSpPr>
-          <p:cNvPr id="140" name="Shape 140"/>
+          <p:cNvPr id="141" name="Shape 141"/>
           <p:cNvSpPr/>
           <p:nvPr>
             <p:ph type="title"/>
@@ -4281,14 +4426,14 @@
             </a:r>
             <a:r>
               <a:rPr sz="4000"/>
-              <a:t>Therapeutic effects</a:t>
+              <a:t>In vivo</a:t>
             </a:r>
           </a:p>
         </p:txBody>
       </p:sp>
       <p:sp>
         <p:nvSpPr>
-          <p:cNvPr id="141" name="Shape 141"/>
+          <p:cNvPr id="142" name="Shape 142"/>
           <p:cNvSpPr/>
           <p:nvPr/>
         </p:nvSpPr>
@@ -4315,10 +4460,10 @@
           </a:bodyPr>
           <a:lstStyle/>
           <a:p>
-            <a:pPr marL="608541" indent="-608541" algn="l" defTabSz="403097">
+            <a:pPr marL="573263" indent="-573263" algn="l" defTabSz="379729">
               <a:buSzPct val="100000"/>
               <a:buAutoNum type="arabicPeriod" startAt="1"/>
-              <a:defRPr sz="3450">
+              <a:defRPr sz="3250">
                 <a:latin typeface="Apple SD 산돌고딕 Neo 세미볼드체"/>
                 <a:ea typeface="Apple SD 산돌고딕 Neo 세미볼드체"/>
                 <a:cs typeface="Apple SD 산돌고딕 Neo 세미볼드체"/>
@@ -4326,48 +4471,57 @@
               </a:defRPr>
             </a:pPr>
             <a:r>
-              <a:t>Although success stories have been reported on repositioning of drugs on the basis of clinical observations of pharmacologic effects in human patients, there is a paucity of published literature on the systematic use of repositioning.  </a:t>
-            </a:r>
-            <a:br/>
-          </a:p>
-          <a:p>
-            <a:pPr marL="608541" indent="-608541" algn="l" defTabSz="403097">
-              <a:buSzPct val="100000"/>
-              <a:buAutoNum type="arabicPeriod" startAt="1"/>
-              <a:defRPr sz="3450">
+              <a:t>In vivo phenotypic screening targeted mutations has been widely used to associate genes with phenotypes.</a:t>
+            </a:r>
+          </a:p>
+          <a:p>
+            <a:pPr algn="l" defTabSz="379729">
+              <a:defRPr sz="3250">
                 <a:latin typeface="Apple SD 산돌고딕 Neo 세미볼드체"/>
                 <a:ea typeface="Apple SD 산돌고딕 Neo 세미볼드체"/>
                 <a:cs typeface="Apple SD 산돌고딕 Neo 세미볼드체"/>
                 <a:sym typeface="Apple SD 산돌고딕 Neo 세미볼드체"/>
               </a:defRPr>
             </a:pPr>
-            <a:r>
-              <a:t>This is perhaps a consequence of the lack of publicly available clinical trial data.</a:t>
-            </a:r>
-          </a:p>
-          <a:p>
-            <a:pPr algn="l" defTabSz="403097">
-              <a:defRPr sz="3450">
+          </a:p>
+          <a:p>
+            <a:pPr marL="573263" indent="-573263" algn="l" defTabSz="379729">
+              <a:buSzPct val="100000"/>
+              <a:buAutoNum type="arabicPeriod" startAt="2"/>
+              <a:defRPr sz="3250">
                 <a:latin typeface="Apple SD 산돌고딕 Neo 세미볼드체"/>
                 <a:ea typeface="Apple SD 산돌고딕 Neo 세미볼드체"/>
                 <a:cs typeface="Apple SD 산돌고딕 Neo 세미볼드체"/>
                 <a:sym typeface="Apple SD 산돌고딕 Neo 세미볼드체"/>
               </a:defRPr>
             </a:pPr>
-          </a:p>
-          <a:p>
-            <a:pPr marL="608541" indent="-608541" algn="l" defTabSz="403097">
-              <a:buSzPct val="100000"/>
-              <a:buAutoNum type="arabicPeriod" startAt="3"/>
-              <a:defRPr sz="3450">
+            <a:r>
+              <a:t> The Mouse Phenome Database (http://phenome.jax.org) contains about 1,400 phenotypic measurements related to human dis- eases, including cancer susceptibility, aging, obesity, infections, atherosclerosis, blood disorders etc.</a:t>
+            </a:r>
+          </a:p>
+          <a:p>
+            <a:pPr algn="l" defTabSz="379729">
+              <a:defRPr sz="3250">
                 <a:latin typeface="Apple SD 산돌고딕 Neo 세미볼드체"/>
                 <a:ea typeface="Apple SD 산돌고딕 Neo 세미볼드체"/>
                 <a:cs typeface="Apple SD 산돌고딕 Neo 세미볼드체"/>
                 <a:sym typeface="Apple SD 산돌고딕 Neo 세미볼드체"/>
               </a:defRPr>
             </a:pPr>
-            <a:r>
-              <a:t>however, such clinical trial data are now becoming more readily available.</a:t>
+          </a:p>
+          <a:p>
+            <a:pPr marL="573263" indent="-573263" algn="l" defTabSz="379729">
+              <a:buSzPct val="100000"/>
+              <a:buAutoNum type="arabicPeriod" startAt="3"/>
+              <a:defRPr sz="3250">
+                <a:latin typeface="Apple SD 산돌고딕 Neo 세미볼드체"/>
+                <a:ea typeface="Apple SD 산돌고딕 Neo 세미볼드체"/>
+                <a:cs typeface="Apple SD 산돌고딕 Neo 세미볼드체"/>
+                <a:sym typeface="Apple SD 산돌고딕 Neo 세미볼드체"/>
+              </a:defRPr>
+            </a:pPr>
+            <a:r>
+              <a:t>We believe such data will play an increasing role in future repositioning efforts, although the translation of  findings from in vivo models to humans may prove challenging.</a:t>
             </a:r>
           </a:p>
         </p:txBody>
@@ -4400,7 +4554,7 @@
       </p:grpSpPr>
       <p:sp>
         <p:nvSpPr>
-          <p:cNvPr id="143" name="Shape 143"/>
+          <p:cNvPr id="144" name="Shape 144"/>
           <p:cNvSpPr/>
           <p:nvPr>
             <p:ph type="title"/>
@@ -4422,15 +4576,15 @@
               <a:t>Other Methods : </a:t>
             </a:r>
             <a:r>
-              <a:rPr sz="2700"/>
-              <a:t>Observational studies, EHRs, and social media</a:t>
+              <a:rPr sz="4000"/>
+              <a:t>Therapeutic effects</a:t>
             </a:r>
           </a:p>
         </p:txBody>
       </p:sp>
       <p:sp>
         <p:nvSpPr>
-          <p:cNvPr id="144" name="Shape 144"/>
+          <p:cNvPr id="145" name="Shape 145"/>
           <p:cNvSpPr/>
           <p:nvPr/>
         </p:nvSpPr>
@@ -4457,10 +4611,10 @@
           </a:bodyPr>
           <a:lstStyle/>
           <a:p>
-            <a:pPr marL="529166" indent="-529166" algn="l" defTabSz="350520">
+            <a:pPr marL="608541" indent="-608541" algn="l" defTabSz="403097">
               <a:buSzPct val="100000"/>
               <a:buAutoNum type="arabicPeriod" startAt="1"/>
-              <a:defRPr sz="3000">
+              <a:defRPr sz="3450">
                 <a:latin typeface="Apple SD 산돌고딕 Neo 세미볼드체"/>
                 <a:ea typeface="Apple SD 산돌고딕 Neo 세미볼드체"/>
                 <a:cs typeface="Apple SD 산돌고딕 Neo 세미볼드체"/>
@@ -4468,57 +4622,48 @@
               </a:defRPr>
             </a:pPr>
             <a:r>
-              <a:t>As drugs progress into the clinic, they generate clinical data that can be analyzed for repositioning opportunities. The almost incomprehensible volume and complexity of EHRs present opportunities that could well be the source of the next great advances in drug repositioning.</a:t>
-            </a:r>
-          </a:p>
-          <a:p>
-            <a:pPr algn="l" defTabSz="350520">
-              <a:defRPr sz="3000">
+              <a:t>Although success stories have been reported on repositioning of drugs on the basis of clinical observations of pharmacologic effects in human patients, there is a paucity of published literature on the systematic use of repositioning.  </a:t>
+            </a:r>
+            <a:br/>
+          </a:p>
+          <a:p>
+            <a:pPr marL="608541" indent="-608541" algn="l" defTabSz="403097">
+              <a:buSzPct val="100000"/>
+              <a:buAutoNum type="arabicPeriod" startAt="1"/>
+              <a:defRPr sz="3450">
                 <a:latin typeface="Apple SD 산돌고딕 Neo 세미볼드체"/>
                 <a:ea typeface="Apple SD 산돌고딕 Neo 세미볼드체"/>
                 <a:cs typeface="Apple SD 산돌고딕 Neo 세미볼드체"/>
                 <a:sym typeface="Apple SD 산돌고딕 Neo 세미볼드체"/>
               </a:defRPr>
             </a:pPr>
-          </a:p>
-          <a:p>
-            <a:pPr marL="529166" indent="-529166" algn="l" defTabSz="350520">
-              <a:buSzPct val="100000"/>
-              <a:buAutoNum type="arabicPeriod" startAt="2"/>
-              <a:defRPr sz="3000">
+            <a:r>
+              <a:t>This is perhaps a consequence of the lack of publicly available clinical trial data.</a:t>
+            </a:r>
+          </a:p>
+          <a:p>
+            <a:pPr algn="l" defTabSz="403097">
+              <a:defRPr sz="3450">
                 <a:latin typeface="Apple SD 산돌고딕 Neo 세미볼드체"/>
                 <a:ea typeface="Apple SD 산돌고딕 Neo 세미볼드체"/>
                 <a:cs typeface="Apple SD 산돌고딕 Neo 세미볼드체"/>
                 <a:sym typeface="Apple SD 산돌고딕 Neo 세미볼드체"/>
               </a:defRPr>
             </a:pPr>
-            <a:r>
-              <a:t>Experimental validation and independent validation add verify to computational hypothesis.</a:t>
-            </a:r>
-          </a:p>
-          <a:p>
-            <a:pPr algn="l" defTabSz="350520">
-              <a:defRPr sz="3000">
+          </a:p>
+          <a:p>
+            <a:pPr marL="608541" indent="-608541" algn="l" defTabSz="403097">
+              <a:buSzPct val="100000"/>
+              <a:buAutoNum type="arabicPeriod" startAt="3"/>
+              <a:defRPr sz="3450">
                 <a:latin typeface="Apple SD 산돌고딕 Neo 세미볼드체"/>
                 <a:ea typeface="Apple SD 산돌고딕 Neo 세미볼드체"/>
                 <a:cs typeface="Apple SD 산돌고딕 Neo 세미볼드체"/>
                 <a:sym typeface="Apple SD 산돌고딕 Neo 세미볼드체"/>
               </a:defRPr>
             </a:pPr>
-          </a:p>
-          <a:p>
-            <a:pPr marL="529166" indent="-529166" algn="l" defTabSz="350520">
-              <a:buSzPct val="100000"/>
-              <a:buAutoNum type="arabicPeriod" startAt="3"/>
-              <a:defRPr sz="3000">
-                <a:latin typeface="Apple SD 산돌고딕 Neo 세미볼드체"/>
-                <a:ea typeface="Apple SD 산돌고딕 Neo 세미볼드체"/>
-                <a:cs typeface="Apple SD 산돌고딕 Neo 세미볼드체"/>
-                <a:sym typeface="Apple SD 산돌고딕 Neo 세미볼드체"/>
-              </a:defRPr>
-            </a:pPr>
-            <a:r>
-              <a:t>Without a computational hypothesis, a preclinical or clinical hypothesis may not be actionable; however, once the two are put together, they can accelerate the path toward a clinical trial.</a:t>
+            <a:r>
+              <a:t>however, such clinical trial data are now becoming more readily available.</a:t>
             </a:r>
           </a:p>
         </p:txBody>

</xml_diff>